<commit_message>
minor fix to a slide
</commit_message>
<xml_diff>
--- a/w7/w7-s8-av-slide1.pptx
+++ b/w7/w7-s8-av-slide1.pptx
@@ -5,14 +5,15 @@
     <p:sldMasterId id="2147483648" r:id="rId1"/>
   </p:sldMasterIdLst>
   <p:notesMasterIdLst>
-    <p:notesMasterId r:id="rId7"/>
+    <p:notesMasterId r:id="rId8"/>
   </p:notesMasterIdLst>
   <p:sldIdLst>
-    <p:sldId id="263" r:id="rId2"/>
-    <p:sldId id="266" r:id="rId3"/>
-    <p:sldId id="267" r:id="rId4"/>
-    <p:sldId id="264" r:id="rId5"/>
-    <p:sldId id="265" r:id="rId6"/>
+    <p:sldId id="268" r:id="rId2"/>
+    <p:sldId id="263" r:id="rId3"/>
+    <p:sldId id="266" r:id="rId4"/>
+    <p:sldId id="267" r:id="rId5"/>
+    <p:sldId id="264" r:id="rId6"/>
+    <p:sldId id="265" r:id="rId7"/>
   </p:sldIdLst>
   <p:sldSz cx="12192000" cy="6858000"/>
   <p:notesSz cx="6858000" cy="9144000"/>
@@ -201,7 +202,7 @@
           <a:p>
             <a:fld id="{22CC90C4-855C-4264-AF5E-5FD74A4CC43F}" type="datetimeFigureOut">
               <a:rPr lang="fr-FR" smtClean="0"/>
-              <a:t>09/07/2018</a:t>
+              <a:t>12/07/2018</a:t>
             </a:fld>
             <a:endParaRPr lang="fr-FR"/>
           </a:p>
@@ -540,7 +541,7 @@
               <a:pPr>
                 <a:defRPr/>
               </a:pPr>
-              <a:t>1</a:t>
+              <a:t>2</a:t>
             </a:fld>
             <a:endParaRPr lang="en-US"/>
           </a:p>
@@ -630,7 +631,7 @@
               <a:pPr>
                 <a:defRPr/>
               </a:pPr>
-              <a:t>4</a:t>
+              <a:t>5</a:t>
             </a:fld>
             <a:endParaRPr lang="en-US"/>
           </a:p>
@@ -720,7 +721,7 @@
               <a:pPr>
                 <a:defRPr/>
               </a:pPr>
-              <a:t>5</a:t>
+              <a:t>6</a:t>
             </a:fld>
             <a:endParaRPr lang="en-US"/>
           </a:p>
@@ -870,7 +871,7 @@
           <a:p>
             <a:fld id="{2D9D616D-B1D5-4DF0-A220-24114155C41E}" type="datetimeFigureOut">
               <a:rPr lang="en-US" smtClean="0"/>
-              <a:t>7/9/2018</a:t>
+              <a:t>7/12/2018</a:t>
             </a:fld>
             <a:endParaRPr lang="en-US"/>
           </a:p>
@@ -1040,7 +1041,7 @@
           <a:p>
             <a:fld id="{2D9D616D-B1D5-4DF0-A220-24114155C41E}" type="datetimeFigureOut">
               <a:rPr lang="en-US" smtClean="0"/>
-              <a:t>7/9/2018</a:t>
+              <a:t>7/12/2018</a:t>
             </a:fld>
             <a:endParaRPr lang="en-US"/>
           </a:p>
@@ -1220,7 +1221,7 @@
           <a:p>
             <a:fld id="{2D9D616D-B1D5-4DF0-A220-24114155C41E}" type="datetimeFigureOut">
               <a:rPr lang="en-US" smtClean="0"/>
-              <a:t>7/9/2018</a:t>
+              <a:t>7/12/2018</a:t>
             </a:fld>
             <a:endParaRPr lang="en-US"/>
           </a:p>
@@ -1390,7 +1391,7 @@
           <a:p>
             <a:fld id="{2D9D616D-B1D5-4DF0-A220-24114155C41E}" type="datetimeFigureOut">
               <a:rPr lang="en-US" smtClean="0"/>
-              <a:t>7/9/2018</a:t>
+              <a:t>7/12/2018</a:t>
             </a:fld>
             <a:endParaRPr lang="en-US"/>
           </a:p>
@@ -1636,7 +1637,7 @@
           <a:p>
             <a:fld id="{2D9D616D-B1D5-4DF0-A220-24114155C41E}" type="datetimeFigureOut">
               <a:rPr lang="en-US" smtClean="0"/>
-              <a:t>7/9/2018</a:t>
+              <a:t>7/12/2018</a:t>
             </a:fld>
             <a:endParaRPr lang="en-US"/>
           </a:p>
@@ -1868,7 +1869,7 @@
           <a:p>
             <a:fld id="{2D9D616D-B1D5-4DF0-A220-24114155C41E}" type="datetimeFigureOut">
               <a:rPr lang="en-US" smtClean="0"/>
-              <a:t>7/9/2018</a:t>
+              <a:t>7/12/2018</a:t>
             </a:fld>
             <a:endParaRPr lang="en-US"/>
           </a:p>
@@ -2235,7 +2236,7 @@
           <a:p>
             <a:fld id="{2D9D616D-B1D5-4DF0-A220-24114155C41E}" type="datetimeFigureOut">
               <a:rPr lang="en-US" smtClean="0"/>
-              <a:t>7/9/2018</a:t>
+              <a:t>7/12/2018</a:t>
             </a:fld>
             <a:endParaRPr lang="en-US"/>
           </a:p>
@@ -2353,7 +2354,7 @@
           <a:p>
             <a:fld id="{2D9D616D-B1D5-4DF0-A220-24114155C41E}" type="datetimeFigureOut">
               <a:rPr lang="en-US" smtClean="0"/>
-              <a:t>7/9/2018</a:t>
+              <a:t>7/12/2018</a:t>
             </a:fld>
             <a:endParaRPr lang="en-US"/>
           </a:p>
@@ -2448,7 +2449,7 @@
           <a:p>
             <a:fld id="{2D9D616D-B1D5-4DF0-A220-24114155C41E}" type="datetimeFigureOut">
               <a:rPr lang="en-US" smtClean="0"/>
-              <a:t>7/9/2018</a:t>
+              <a:t>7/12/2018</a:t>
             </a:fld>
             <a:endParaRPr lang="en-US"/>
           </a:p>
@@ -2725,7 +2726,7 @@
           <a:p>
             <a:fld id="{2D9D616D-B1D5-4DF0-A220-24114155C41E}" type="datetimeFigureOut">
               <a:rPr lang="en-US" smtClean="0"/>
-              <a:t>7/9/2018</a:t>
+              <a:t>7/12/2018</a:t>
             </a:fld>
             <a:endParaRPr lang="en-US"/>
           </a:p>
@@ -2978,7 +2979,7 @@
           <a:p>
             <a:fld id="{2D9D616D-B1D5-4DF0-A220-24114155C41E}" type="datetimeFigureOut">
               <a:rPr lang="en-US" smtClean="0"/>
-              <a:t>7/9/2018</a:t>
+              <a:t>7/12/2018</a:t>
             </a:fld>
             <a:endParaRPr lang="en-US"/>
           </a:p>
@@ -3191,7 +3192,7 @@
           <a:p>
             <a:fld id="{2D9D616D-B1D5-4DF0-A220-24114155C41E}" type="datetimeFigureOut">
               <a:rPr lang="en-US" smtClean="0"/>
-              <a:t>7/9/2018</a:t>
+              <a:t>7/12/2018</a:t>
             </a:fld>
             <a:endParaRPr lang="en-US"/>
           </a:p>
@@ -3598,6 +3599,74 @@
       </p:grpSpPr>
       <p:sp>
         <p:nvSpPr>
+          <p:cNvPr id="2" name="Titre 1"/>
+          <p:cNvSpPr>
+            <a:spLocks noGrp="1"/>
+          </p:cNvSpPr>
+          <p:nvPr>
+            <p:ph type="title"/>
+          </p:nvPr>
+        </p:nvSpPr>
+        <p:spPr/>
+        <p:txBody>
+          <a:bodyPr/>
+          <a:lstStyle/>
+          <a:p>
+            <a:endParaRPr lang="fr-FR"/>
+          </a:p>
+        </p:txBody>
+      </p:sp>
+      <p:sp>
+        <p:nvSpPr>
+          <p:cNvPr id="3" name="Espace réservé du contenu 2"/>
+          <p:cNvSpPr>
+            <a:spLocks noGrp="1"/>
+          </p:cNvSpPr>
+          <p:nvPr>
+            <p:ph idx="1"/>
+          </p:nvPr>
+        </p:nvSpPr>
+        <p:spPr/>
+        <p:txBody>
+          <a:bodyPr/>
+          <a:lstStyle/>
+          <a:p>
+            <a:endParaRPr lang="fr-FR"/>
+          </a:p>
+        </p:txBody>
+      </p:sp>
+    </p:spTree>
+    <p:extLst>
+      <p:ext uri="{BB962C8B-B14F-4D97-AF65-F5344CB8AC3E}">
+        <p14:creationId xmlns:p14="http://schemas.microsoft.com/office/powerpoint/2010/main" val="767270541"/>
+      </p:ext>
+    </p:extLst>
+  </p:cSld>
+  <p:clrMapOvr>
+    <a:masterClrMapping/>
+  </p:clrMapOvr>
+</p:sld>
+</file>
+
+<file path=ppt/slides/slide2.xml><?xml version="1.0" encoding="utf-8"?>
+<p:sld xmlns:a="http://schemas.openxmlformats.org/drawingml/2006/main" xmlns:r="http://schemas.openxmlformats.org/officeDocument/2006/relationships" xmlns:p="http://schemas.openxmlformats.org/presentationml/2006/main">
+  <p:cSld>
+    <p:spTree>
+      <p:nvGrpSpPr>
+        <p:cNvPr id="1" name=""/>
+        <p:cNvGrpSpPr/>
+        <p:nvPr/>
+      </p:nvGrpSpPr>
+      <p:grpSpPr>
+        <a:xfrm>
+          <a:off x="0" y="0"/>
+          <a:ext cx="0" cy="0"/>
+          <a:chOff x="0" y="0"/>
+          <a:chExt cx="0" cy="0"/>
+        </a:xfrm>
+      </p:grpSpPr>
+      <p:sp>
+        <p:nvSpPr>
           <p:cNvPr id="3" name="Espace réservé du contenu 2"/>
           <p:cNvSpPr>
             <a:spLocks noGrp="1"/>
@@ -3694,14 +3763,7 @@
                 <a:latin typeface="Courier New" panose="02070309020205020404" pitchFamily="49" charset="0"/>
                 <a:cs typeface="Courier New" panose="02070309020205020404" pitchFamily="49" charset="0"/>
               </a:rPr>
-              <a:t>R&amp;D', </a:t>
-            </a:r>
-            <a:r>
-              <a:rPr lang="en-US" sz="2000" dirty="0" smtClean="0">
-                <a:latin typeface="Courier New" panose="02070309020205020404" pitchFamily="49" charset="0"/>
-                <a:cs typeface="Courier New" panose="02070309020205020404" pitchFamily="49" charset="0"/>
-              </a:rPr>
-              <a:t>'RH']})</a:t>
+              <a:t>R&amp;D', 'RH']})</a:t>
             </a:r>
             <a:endParaRPr lang="en-US" sz="2000" dirty="0">
               <a:latin typeface="Courier New" panose="02070309020205020404" pitchFamily="49" charset="0"/>
@@ -3731,28 +3793,14 @@
                 <a:latin typeface="Courier New" panose="02070309020205020404" pitchFamily="49" charset="0"/>
                 <a:cs typeface="Courier New" panose="02070309020205020404" pitchFamily="49" charset="0"/>
               </a:rPr>
-              <a:t>({</a:t>
-            </a:r>
-            <a:r>
-              <a:rPr lang="en-US" sz="2000" dirty="0">
-                <a:latin typeface="Courier New" panose="02070309020205020404" pitchFamily="49" charset="0"/>
-                <a:cs typeface="Courier New" panose="02070309020205020404" pitchFamily="49" charset="0"/>
-              </a:rPr>
-              <a:t>'personnel</a:t>
+              <a:t>({'personnel</a:t>
             </a:r>
             <a:r>
               <a:rPr lang="en-US" sz="2000" dirty="0" smtClean="0">
                 <a:latin typeface="Courier New" panose="02070309020205020404" pitchFamily="49" charset="0"/>
                 <a:cs typeface="Courier New" panose="02070309020205020404" pitchFamily="49" charset="0"/>
               </a:rPr>
-              <a:t>'</a:t>
-            </a:r>
-            <a:r>
-              <a:rPr lang="en-US" sz="2000" dirty="0" smtClean="0">
-                <a:latin typeface="Courier New" panose="02070309020205020404" pitchFamily="49" charset="0"/>
-                <a:cs typeface="Courier New" panose="02070309020205020404" pitchFamily="49" charset="0"/>
-              </a:rPr>
-              <a:t>: </a:t>
+              <a:t>': </a:t>
             </a:r>
             <a:r>
               <a:rPr lang="en-US" sz="2000" dirty="0">
@@ -3989,14 +4037,7 @@
                 <a:latin typeface="Courier New" panose="02070309020205020404" pitchFamily="49" charset="0"/>
                 <a:cs typeface="Courier New" panose="02070309020205020404" pitchFamily="49" charset="0"/>
               </a:rPr>
-              <a:t>RH       </a:t>
-            </a:r>
-            <a:r>
-              <a:rPr lang="en-US" sz="2000" dirty="0" smtClean="0">
-                <a:latin typeface="Courier New" panose="02070309020205020404" pitchFamily="49" charset="0"/>
-                <a:cs typeface="Courier New" panose="02070309020205020404" pitchFamily="49" charset="0"/>
-              </a:rPr>
-              <a:t>2    </a:t>
+              <a:t>RH       2    </a:t>
             </a:r>
             <a:r>
               <a:rPr lang="en-US" sz="2000" dirty="0">
@@ -5787,81 +5828,6 @@
 </p:sld>
 </file>
 
-<file path=ppt/slides/slide2.xml><?xml version="1.0" encoding="utf-8"?>
-<p:sld xmlns:a="http://schemas.openxmlformats.org/drawingml/2006/main" xmlns:r="http://schemas.openxmlformats.org/officeDocument/2006/relationships" xmlns:p="http://schemas.openxmlformats.org/presentationml/2006/main">
-  <p:cSld>
-    <p:spTree>
-      <p:nvGrpSpPr>
-        <p:cNvPr id="1" name=""/>
-        <p:cNvGrpSpPr/>
-        <p:nvPr/>
-      </p:nvGrpSpPr>
-      <p:grpSpPr>
-        <a:xfrm>
-          <a:off x="0" y="0"/>
-          <a:ext cx="0" cy="0"/>
-          <a:chOff x="0" y="0"/>
-          <a:chExt cx="0" cy="0"/>
-        </a:xfrm>
-      </p:grpSpPr>
-      <p:sp>
-        <p:nvSpPr>
-          <p:cNvPr id="2" name="Titre 1"/>
-          <p:cNvSpPr>
-            <a:spLocks noGrp="1"/>
-          </p:cNvSpPr>
-          <p:nvPr>
-            <p:ph type="title"/>
-          </p:nvPr>
-        </p:nvSpPr>
-        <p:spPr/>
-        <p:txBody>
-          <a:bodyPr/>
-          <a:lstStyle/>
-          <a:p>
-            <a:endParaRPr lang="fr-FR"/>
-          </a:p>
-        </p:txBody>
-      </p:sp>
-      <p:sp>
-        <p:nvSpPr>
-          <p:cNvPr id="3" name="Espace réservé du contenu 2"/>
-          <p:cNvSpPr>
-            <a:spLocks noGrp="1"/>
-          </p:cNvSpPr>
-          <p:nvPr>
-            <p:ph idx="1"/>
-          </p:nvPr>
-        </p:nvSpPr>
-        <p:spPr/>
-        <p:txBody>
-          <a:bodyPr/>
-          <a:lstStyle/>
-          <a:p>
-            <a:endParaRPr lang="fr-FR"/>
-          </a:p>
-        </p:txBody>
-      </p:sp>
-    </p:spTree>
-    <p:extLst>
-      <p:ext uri="{BB962C8B-B14F-4D97-AF65-F5344CB8AC3E}">
-        <p14:creationId xmlns:p14="http://schemas.microsoft.com/office/powerpoint/2010/main" val="2391849948"/>
-      </p:ext>
-    </p:extLst>
-  </p:cSld>
-  <p:clrMapOvr>
-    <a:masterClrMapping/>
-  </p:clrMapOvr>
-  <p:timing>
-    <p:tnLst>
-      <p:par>
-        <p:cTn id="1" dur="indefinite" restart="never" nodeType="tmRoot"/>
-      </p:par>
-    </p:tnLst>
-  </p:timing>
-</p:sld>
-</file>
-
 <file path=ppt/slides/slide3.xml><?xml version="1.0" encoding="utf-8"?>
 <p:sld xmlns:a="http://schemas.openxmlformats.org/drawingml/2006/main" xmlns:r="http://schemas.openxmlformats.org/officeDocument/2006/relationships" xmlns:p="http://schemas.openxmlformats.org/presentationml/2006/main">
   <p:cSld>
@@ -5894,6 +5860,81 @@
           <a:bodyPr/>
           <a:lstStyle/>
           <a:p>
+            <a:endParaRPr lang="fr-FR"/>
+          </a:p>
+        </p:txBody>
+      </p:sp>
+      <p:sp>
+        <p:nvSpPr>
+          <p:cNvPr id="3" name="Espace réservé du contenu 2"/>
+          <p:cNvSpPr>
+            <a:spLocks noGrp="1"/>
+          </p:cNvSpPr>
+          <p:nvPr>
+            <p:ph idx="1"/>
+          </p:nvPr>
+        </p:nvSpPr>
+        <p:spPr/>
+        <p:txBody>
+          <a:bodyPr/>
+          <a:lstStyle/>
+          <a:p>
+            <a:endParaRPr lang="fr-FR"/>
+          </a:p>
+        </p:txBody>
+      </p:sp>
+    </p:spTree>
+    <p:extLst>
+      <p:ext uri="{BB962C8B-B14F-4D97-AF65-F5344CB8AC3E}">
+        <p14:creationId xmlns:p14="http://schemas.microsoft.com/office/powerpoint/2010/main" val="2391849948"/>
+      </p:ext>
+    </p:extLst>
+  </p:cSld>
+  <p:clrMapOvr>
+    <a:masterClrMapping/>
+  </p:clrMapOvr>
+  <p:timing>
+    <p:tnLst>
+      <p:par>
+        <p:cTn id="1" dur="indefinite" restart="never" nodeType="tmRoot"/>
+      </p:par>
+    </p:tnLst>
+  </p:timing>
+</p:sld>
+</file>
+
+<file path=ppt/slides/slide4.xml><?xml version="1.0" encoding="utf-8"?>
+<p:sld xmlns:a="http://schemas.openxmlformats.org/drawingml/2006/main" xmlns:r="http://schemas.openxmlformats.org/officeDocument/2006/relationships" xmlns:p="http://schemas.openxmlformats.org/presentationml/2006/main">
+  <p:cSld>
+    <p:spTree>
+      <p:nvGrpSpPr>
+        <p:cNvPr id="1" name=""/>
+        <p:cNvGrpSpPr/>
+        <p:nvPr/>
+      </p:nvGrpSpPr>
+      <p:grpSpPr>
+        <a:xfrm>
+          <a:off x="0" y="0"/>
+          <a:ext cx="0" cy="0"/>
+          <a:chOff x="0" y="0"/>
+          <a:chExt cx="0" cy="0"/>
+        </a:xfrm>
+      </p:grpSpPr>
+      <p:sp>
+        <p:nvSpPr>
+          <p:cNvPr id="2" name="Titre 1"/>
+          <p:cNvSpPr>
+            <a:spLocks noGrp="1"/>
+          </p:cNvSpPr>
+          <p:nvPr>
+            <p:ph type="title"/>
+          </p:nvPr>
+        </p:nvSpPr>
+        <p:spPr/>
+        <p:txBody>
+          <a:bodyPr/>
+          <a:lstStyle/>
+          <a:p>
             <a:pPr algn="ctr"/>
             <a:r>
               <a:rPr lang="fr-FR" dirty="0" smtClean="0"/>
@@ -5916,7 +5957,7 @@
 </p:sld>
 </file>
 
-<file path=ppt/slides/slide4.xml><?xml version="1.0" encoding="utf-8"?>
+<file path=ppt/slides/slide5.xml><?xml version="1.0" encoding="utf-8"?>
 <p:sld xmlns:a="http://schemas.openxmlformats.org/drawingml/2006/main" xmlns:r="http://schemas.openxmlformats.org/officeDocument/2006/relationships" xmlns:p="http://schemas.openxmlformats.org/presentationml/2006/main">
   <p:cSld>
     <p:spTree>
@@ -7397,7 +7438,7 @@
 </p:sld>
 </file>
 
-<file path=ppt/slides/slide5.xml><?xml version="1.0" encoding="utf-8"?>
+<file path=ppt/slides/slide6.xml><?xml version="1.0" encoding="utf-8"?>
 <p:sld xmlns:a="http://schemas.openxmlformats.org/drawingml/2006/main" xmlns:r="http://schemas.openxmlformats.org/officeDocument/2006/relationships" xmlns:p="http://schemas.openxmlformats.org/presentationml/2006/main">
   <p:cSld>
     <p:spTree>
@@ -7898,7 +7939,7 @@
               <a:pPr>
                 <a:defRPr/>
               </a:pPr>
-              <a:t>5</a:t>
+              <a:t>6</a:t>
             </a:fld>
             <a:endParaRPr lang="fr-FR" dirty="0"/>
           </a:p>

</xml_diff>